<commit_message>
venue style changed 1
</commit_message>
<xml_diff>
--- a/Presentation1.pptx
+++ b/Presentation1.pptx
@@ -8,6 +8,7 @@
     <p:sldId id="256" r:id="rId2"/>
     <p:sldId id="257" r:id="rId3"/>
     <p:sldId id="258" r:id="rId4"/>
+    <p:sldId id="259" r:id="rId5"/>
   </p:sldIdLst>
   <p:sldSz cx="12192000" cy="6858000"/>
   <p:notesSz cx="6858000" cy="9144000"/>
@@ -261,7 +262,7 @@
           <a:p>
             <a:fld id="{91B66ED7-A90E-4473-A4FF-165DCAE59CAE}" type="datetimeFigureOut">
               <a:rPr lang="en-US" smtClean="0"/>
-              <a:t>1/8/2020</a:t>
+              <a:t>1/9/2020</a:t>
             </a:fld>
             <a:endParaRPr lang="en-US"/>
           </a:p>
@@ -459,7 +460,7 @@
           <a:p>
             <a:fld id="{91B66ED7-A90E-4473-A4FF-165DCAE59CAE}" type="datetimeFigureOut">
               <a:rPr lang="en-US" smtClean="0"/>
-              <a:t>1/8/2020</a:t>
+              <a:t>1/9/2020</a:t>
             </a:fld>
             <a:endParaRPr lang="en-US"/>
           </a:p>
@@ -667,7 +668,7 @@
           <a:p>
             <a:fld id="{91B66ED7-A90E-4473-A4FF-165DCAE59CAE}" type="datetimeFigureOut">
               <a:rPr lang="en-US" smtClean="0"/>
-              <a:t>1/8/2020</a:t>
+              <a:t>1/9/2020</a:t>
             </a:fld>
             <a:endParaRPr lang="en-US"/>
           </a:p>
@@ -865,7 +866,7 @@
           <a:p>
             <a:fld id="{91B66ED7-A90E-4473-A4FF-165DCAE59CAE}" type="datetimeFigureOut">
               <a:rPr lang="en-US" smtClean="0"/>
-              <a:t>1/8/2020</a:t>
+              <a:t>1/9/2020</a:t>
             </a:fld>
             <a:endParaRPr lang="en-US"/>
           </a:p>
@@ -1140,7 +1141,7 @@
           <a:p>
             <a:fld id="{91B66ED7-A90E-4473-A4FF-165DCAE59CAE}" type="datetimeFigureOut">
               <a:rPr lang="en-US" smtClean="0"/>
-              <a:t>1/8/2020</a:t>
+              <a:t>1/9/2020</a:t>
             </a:fld>
             <a:endParaRPr lang="en-US"/>
           </a:p>
@@ -1405,7 +1406,7 @@
           <a:p>
             <a:fld id="{91B66ED7-A90E-4473-A4FF-165DCAE59CAE}" type="datetimeFigureOut">
               <a:rPr lang="en-US" smtClean="0"/>
-              <a:t>1/8/2020</a:t>
+              <a:t>1/9/2020</a:t>
             </a:fld>
             <a:endParaRPr lang="en-US"/>
           </a:p>
@@ -1817,7 +1818,7 @@
           <a:p>
             <a:fld id="{91B66ED7-A90E-4473-A4FF-165DCAE59CAE}" type="datetimeFigureOut">
               <a:rPr lang="en-US" smtClean="0"/>
-              <a:t>1/8/2020</a:t>
+              <a:t>1/9/2020</a:t>
             </a:fld>
             <a:endParaRPr lang="en-US"/>
           </a:p>
@@ -1958,7 +1959,7 @@
           <a:p>
             <a:fld id="{91B66ED7-A90E-4473-A4FF-165DCAE59CAE}" type="datetimeFigureOut">
               <a:rPr lang="en-US" smtClean="0"/>
-              <a:t>1/8/2020</a:t>
+              <a:t>1/9/2020</a:t>
             </a:fld>
             <a:endParaRPr lang="en-US"/>
           </a:p>
@@ -2071,7 +2072,7 @@
           <a:p>
             <a:fld id="{91B66ED7-A90E-4473-A4FF-165DCAE59CAE}" type="datetimeFigureOut">
               <a:rPr lang="en-US" smtClean="0"/>
-              <a:t>1/8/2020</a:t>
+              <a:t>1/9/2020</a:t>
             </a:fld>
             <a:endParaRPr lang="en-US"/>
           </a:p>
@@ -2382,7 +2383,7 @@
           <a:p>
             <a:fld id="{91B66ED7-A90E-4473-A4FF-165DCAE59CAE}" type="datetimeFigureOut">
               <a:rPr lang="en-US" smtClean="0"/>
-              <a:t>1/8/2020</a:t>
+              <a:t>1/9/2020</a:t>
             </a:fld>
             <a:endParaRPr lang="en-US"/>
           </a:p>
@@ -2670,7 +2671,7 @@
           <a:p>
             <a:fld id="{91B66ED7-A90E-4473-A4FF-165DCAE59CAE}" type="datetimeFigureOut">
               <a:rPr lang="en-US" smtClean="0"/>
-              <a:t>1/8/2020</a:t>
+              <a:t>1/9/2020</a:t>
             </a:fld>
             <a:endParaRPr lang="en-US"/>
           </a:p>
@@ -2911,7 +2912,7 @@
           <a:p>
             <a:fld id="{91B66ED7-A90E-4473-A4FF-165DCAE59CAE}" type="datetimeFigureOut">
               <a:rPr lang="en-US" smtClean="0"/>
-              <a:t>1/8/2020</a:t>
+              <a:t>1/9/2020</a:t>
             </a:fld>
             <a:endParaRPr lang="en-US"/>
           </a:p>
@@ -4184,6 +4185,994 @@
 </p:sld>
 </file>
 
+<file path=ppt/slides/slide4.xml><?xml version="1.0" encoding="utf-8"?>
+<p:sld xmlns:a="http://schemas.openxmlformats.org/drawingml/2006/main" xmlns:r="http://schemas.openxmlformats.org/officeDocument/2006/relationships" xmlns:p="http://schemas.openxmlformats.org/presentationml/2006/main">
+  <p:cSld>
+    <p:spTree>
+      <p:nvGrpSpPr>
+        <p:cNvPr id="1" name=""/>
+        <p:cNvGrpSpPr/>
+        <p:nvPr/>
+      </p:nvGrpSpPr>
+      <p:grpSpPr>
+        <a:xfrm>
+          <a:off x="0" y="0"/>
+          <a:ext cx="0" cy="0"/>
+          <a:chOff x="0" y="0"/>
+          <a:chExt cx="0" cy="0"/>
+        </a:xfrm>
+      </p:grpSpPr>
+      <p:pic>
+        <p:nvPicPr>
+          <p:cNvPr id="3" name="Picture 2">
+            <a:extLst>
+              <a:ext uri="{FF2B5EF4-FFF2-40B4-BE49-F238E27FC236}">
+                <a16:creationId xmlns:a16="http://schemas.microsoft.com/office/drawing/2014/main" id="{0CE78B9A-46D6-4745-AF28-1CD0147E0FA3}"/>
+              </a:ext>
+            </a:extLst>
+          </p:cNvPr>
+          <p:cNvPicPr>
+            <a:picLocks noChangeAspect="1"/>
+          </p:cNvPicPr>
+          <p:nvPr/>
+        </p:nvPicPr>
+        <p:blipFill>
+          <a:blip r:embed="rId2">
+            <a:extLst>
+              <a:ext uri="{28A0092B-C50C-407E-A947-70E740481C1C}">
+                <a14:useLocalDpi xmlns:a14="http://schemas.microsoft.com/office/drawing/2010/main" val="0"/>
+              </a:ext>
+            </a:extLst>
+          </a:blip>
+          <a:srcRect/>
+          <a:stretch/>
+        </p:blipFill>
+        <p:spPr>
+          <a:xfrm>
+            <a:off x="229107" y="210104"/>
+            <a:ext cx="5685098" cy="4257901"/>
+          </a:xfrm>
+          <a:prstGeom prst="rect">
+            <a:avLst/>
+          </a:prstGeom>
+        </p:spPr>
+      </p:pic>
+      <p:sp>
+        <p:nvSpPr>
+          <p:cNvPr id="6" name="Rectangle 5">
+            <a:extLst>
+              <a:ext uri="{FF2B5EF4-FFF2-40B4-BE49-F238E27FC236}">
+                <a16:creationId xmlns:a16="http://schemas.microsoft.com/office/drawing/2014/main" id="{FFC1F18C-F03E-41FF-BAFA-92CDF4853053}"/>
+              </a:ext>
+            </a:extLst>
+          </p:cNvPr>
+          <p:cNvSpPr/>
+          <p:nvPr/>
+        </p:nvSpPr>
+        <p:spPr>
+          <a:xfrm>
+            <a:off x="231850" y="1704341"/>
+            <a:ext cx="5682356" cy="2763664"/>
+          </a:xfrm>
+          <a:prstGeom prst="rect">
+            <a:avLst/>
+          </a:prstGeom>
+          <a:gradFill flip="none" rotWithShape="1">
+            <a:gsLst>
+              <a:gs pos="0">
+                <a:schemeClr val="bg1"/>
+              </a:gs>
+              <a:gs pos="43000">
+                <a:schemeClr val="bg1">
+                  <a:alpha val="73000"/>
+                </a:schemeClr>
+              </a:gs>
+              <a:gs pos="100000">
+                <a:schemeClr val="accent1">
+                  <a:lumMod val="30000"/>
+                  <a:lumOff val="70000"/>
+                  <a:alpha val="0"/>
+                </a:schemeClr>
+              </a:gs>
+            </a:gsLst>
+            <a:lin ang="16200000" scaled="1"/>
+            <a:tileRect/>
+          </a:gradFill>
+          <a:ln>
+            <a:noFill/>
+          </a:ln>
+        </p:spPr>
+        <p:style>
+          <a:lnRef idx="2">
+            <a:schemeClr val="accent1">
+              <a:shade val="50000"/>
+            </a:schemeClr>
+          </a:lnRef>
+          <a:fillRef idx="1">
+            <a:schemeClr val="accent1"/>
+          </a:fillRef>
+          <a:effectRef idx="0">
+            <a:schemeClr val="accent1"/>
+          </a:effectRef>
+          <a:fontRef idx="minor">
+            <a:schemeClr val="lt1"/>
+          </a:fontRef>
+        </p:style>
+        <p:txBody>
+          <a:bodyPr rtlCol="0" anchor="ctr"/>
+          <a:lstStyle/>
+          <a:p>
+            <a:pPr algn="ctr"/>
+            <a:endParaRPr lang="en-US"/>
+          </a:p>
+        </p:txBody>
+      </p:sp>
+      <p:pic>
+        <p:nvPicPr>
+          <p:cNvPr id="5" name="Picture 4">
+            <a:extLst>
+              <a:ext uri="{FF2B5EF4-FFF2-40B4-BE49-F238E27FC236}">
+                <a16:creationId xmlns:a16="http://schemas.microsoft.com/office/drawing/2014/main" id="{BE5A2AA3-93F0-4494-A981-E5244736B231}"/>
+              </a:ext>
+            </a:extLst>
+          </p:cNvPr>
+          <p:cNvPicPr>
+            <a:picLocks noChangeAspect="1"/>
+          </p:cNvPicPr>
+          <p:nvPr/>
+        </p:nvPicPr>
+        <p:blipFill>
+          <a:blip r:embed="rId3">
+            <a:extLst>
+              <a:ext uri="{28A0092B-C50C-407E-A947-70E740481C1C}">
+                <a14:useLocalDpi xmlns:a14="http://schemas.microsoft.com/office/drawing/2010/main" val="0"/>
+              </a:ext>
+            </a:extLst>
+          </a:blip>
+          <a:stretch>
+            <a:fillRect/>
+          </a:stretch>
+        </p:blipFill>
+        <p:spPr>
+          <a:xfrm rot="20986080">
+            <a:off x="533313" y="2784028"/>
+            <a:ext cx="1768883" cy="831375"/>
+          </a:xfrm>
+          <a:prstGeom prst="rect">
+            <a:avLst/>
+          </a:prstGeom>
+        </p:spPr>
+      </p:pic>
+      <p:sp>
+        <p:nvSpPr>
+          <p:cNvPr id="7" name="Rectangle 6">
+            <a:extLst>
+              <a:ext uri="{FF2B5EF4-FFF2-40B4-BE49-F238E27FC236}">
+                <a16:creationId xmlns:a16="http://schemas.microsoft.com/office/drawing/2014/main" id="{C8E78A1D-26A6-4B2F-B589-BC93BC667840}"/>
+              </a:ext>
+            </a:extLst>
+          </p:cNvPr>
+          <p:cNvSpPr/>
+          <p:nvPr/>
+        </p:nvSpPr>
+        <p:spPr>
+          <a:xfrm rot="20727039">
+            <a:off x="812095" y="3518909"/>
+            <a:ext cx="1785400" cy="276999"/>
+          </a:xfrm>
+          <a:prstGeom prst="rect">
+            <a:avLst/>
+          </a:prstGeom>
+          <a:solidFill>
+            <a:schemeClr val="tx1"/>
+          </a:solidFill>
+        </p:spPr>
+        <p:txBody>
+          <a:bodyPr wrap="square" lIns="91440" tIns="45720" rIns="91440" bIns="45720">
+            <a:spAutoFit/>
+          </a:bodyPr>
+          <a:lstStyle/>
+          <a:p>
+            <a:pPr algn="ctr"/>
+            <a:r>
+              <a:rPr lang="en-US" sz="1200" b="0" cap="none" spc="0" dirty="0">
+                <a:ln w="0"/>
+                <a:solidFill>
+                  <a:schemeClr val="bg1"/>
+                </a:solidFill>
+                <a:latin typeface="Arial Black" panose="020B0A04020102020204" pitchFamily="34" charset="0"/>
+              </a:rPr>
+              <a:t>7</a:t>
+            </a:r>
+            <a:r>
+              <a:rPr lang="en-US" sz="1200" b="0" cap="none" spc="0" baseline="30000" dirty="0">
+                <a:ln w="0"/>
+                <a:solidFill>
+                  <a:schemeClr val="bg1"/>
+                </a:solidFill>
+                <a:latin typeface="Arial Black" panose="020B0A04020102020204" pitchFamily="34" charset="0"/>
+              </a:rPr>
+              <a:t>th</a:t>
+            </a:r>
+            <a:r>
+              <a:rPr lang="en-US" sz="1200" b="0" cap="none" spc="0" dirty="0">
+                <a:ln w="0"/>
+                <a:solidFill>
+                  <a:schemeClr val="bg1"/>
+                </a:solidFill>
+                <a:latin typeface="Arial Black" panose="020B0A04020102020204" pitchFamily="34" charset="0"/>
+              </a:rPr>
+              <a:t> – 8</a:t>
+            </a:r>
+            <a:r>
+              <a:rPr lang="en-US" sz="1200" b="0" cap="none" spc="0" baseline="30000" dirty="0">
+                <a:ln w="0"/>
+                <a:solidFill>
+                  <a:schemeClr val="bg1"/>
+                </a:solidFill>
+                <a:latin typeface="Arial Black" panose="020B0A04020102020204" pitchFamily="34" charset="0"/>
+              </a:rPr>
+              <a:t>th</a:t>
+            </a:r>
+            <a:r>
+              <a:rPr lang="en-US" sz="1200" b="0" cap="none" spc="0" dirty="0">
+                <a:ln w="0"/>
+                <a:solidFill>
+                  <a:schemeClr val="bg1"/>
+                </a:solidFill>
+                <a:latin typeface="Arial Black" panose="020B0A04020102020204" pitchFamily="34" charset="0"/>
+              </a:rPr>
+              <a:t> May, 2020</a:t>
+            </a:r>
+          </a:p>
+        </p:txBody>
+      </p:sp>
+      <p:pic>
+        <p:nvPicPr>
+          <p:cNvPr id="10" name="Picture 9">
+            <a:extLst>
+              <a:ext uri="{FF2B5EF4-FFF2-40B4-BE49-F238E27FC236}">
+                <a16:creationId xmlns:a16="http://schemas.microsoft.com/office/drawing/2014/main" id="{99E6F14B-E668-4A7F-A48F-B7A441DEC3AB}"/>
+              </a:ext>
+            </a:extLst>
+          </p:cNvPr>
+          <p:cNvPicPr>
+            <a:picLocks noChangeAspect="1"/>
+          </p:cNvPicPr>
+          <p:nvPr/>
+        </p:nvPicPr>
+        <p:blipFill>
+          <a:blip r:embed="rId4">
+            <a:extLst>
+              <a:ext uri="{28A0092B-C50C-407E-A947-70E740481C1C}">
+                <a14:useLocalDpi xmlns:a14="http://schemas.microsoft.com/office/drawing/2010/main" val="0"/>
+              </a:ext>
+            </a:extLst>
+          </a:blip>
+          <a:stretch>
+            <a:fillRect/>
+          </a:stretch>
+        </p:blipFill>
+        <p:spPr>
+          <a:xfrm rot="20700366">
+            <a:off x="2156350" y="3010829"/>
+            <a:ext cx="411242" cy="235391"/>
+          </a:xfrm>
+          <a:prstGeom prst="rect">
+            <a:avLst/>
+          </a:prstGeom>
+        </p:spPr>
+      </p:pic>
+      <p:pic>
+        <p:nvPicPr>
+          <p:cNvPr id="12" name="Picture 11">
+            <a:extLst>
+              <a:ext uri="{FF2B5EF4-FFF2-40B4-BE49-F238E27FC236}">
+                <a16:creationId xmlns:a16="http://schemas.microsoft.com/office/drawing/2014/main" id="{CFB700CB-AB42-493B-A4BD-7744E21BE833}"/>
+              </a:ext>
+            </a:extLst>
+          </p:cNvPr>
+          <p:cNvPicPr>
+            <a:picLocks noChangeAspect="1"/>
+          </p:cNvPicPr>
+          <p:nvPr/>
+        </p:nvPicPr>
+        <p:blipFill>
+          <a:blip r:embed="rId5">
+            <a:extLst>
+              <a:ext uri="{28A0092B-C50C-407E-A947-70E740481C1C}">
+                <a14:useLocalDpi xmlns:a14="http://schemas.microsoft.com/office/drawing/2010/main" val="0"/>
+              </a:ext>
+            </a:extLst>
+          </a:blip>
+          <a:srcRect/>
+          <a:stretch/>
+        </p:blipFill>
+        <p:spPr>
+          <a:xfrm>
+            <a:off x="6246596" y="210105"/>
+            <a:ext cx="5685098" cy="4257900"/>
+          </a:xfrm>
+          <a:prstGeom prst="rect">
+            <a:avLst/>
+          </a:prstGeom>
+        </p:spPr>
+      </p:pic>
+      <p:sp>
+        <p:nvSpPr>
+          <p:cNvPr id="13" name="Rectangle 12">
+            <a:extLst>
+              <a:ext uri="{FF2B5EF4-FFF2-40B4-BE49-F238E27FC236}">
+                <a16:creationId xmlns:a16="http://schemas.microsoft.com/office/drawing/2014/main" id="{7C9F1142-9E74-411C-8B9A-68DCC6EBD692}"/>
+              </a:ext>
+            </a:extLst>
+          </p:cNvPr>
+          <p:cNvSpPr/>
+          <p:nvPr/>
+        </p:nvSpPr>
+        <p:spPr>
+          <a:xfrm>
+            <a:off x="6249339" y="1704341"/>
+            <a:ext cx="5682356" cy="2763664"/>
+          </a:xfrm>
+          <a:prstGeom prst="rect">
+            <a:avLst/>
+          </a:prstGeom>
+          <a:gradFill flip="none" rotWithShape="1">
+            <a:gsLst>
+              <a:gs pos="0">
+                <a:schemeClr val="bg1"/>
+              </a:gs>
+              <a:gs pos="43000">
+                <a:schemeClr val="bg1">
+                  <a:alpha val="73000"/>
+                </a:schemeClr>
+              </a:gs>
+              <a:gs pos="100000">
+                <a:schemeClr val="accent1">
+                  <a:lumMod val="30000"/>
+                  <a:lumOff val="70000"/>
+                  <a:alpha val="0"/>
+                </a:schemeClr>
+              </a:gs>
+            </a:gsLst>
+            <a:lin ang="16200000" scaled="1"/>
+            <a:tileRect/>
+          </a:gradFill>
+          <a:ln>
+            <a:noFill/>
+          </a:ln>
+        </p:spPr>
+        <p:style>
+          <a:lnRef idx="2">
+            <a:schemeClr val="accent1">
+              <a:shade val="50000"/>
+            </a:schemeClr>
+          </a:lnRef>
+          <a:fillRef idx="1">
+            <a:schemeClr val="accent1"/>
+          </a:fillRef>
+          <a:effectRef idx="0">
+            <a:schemeClr val="accent1"/>
+          </a:effectRef>
+          <a:fontRef idx="minor">
+            <a:schemeClr val="lt1"/>
+          </a:fontRef>
+        </p:style>
+        <p:txBody>
+          <a:bodyPr rtlCol="0" anchor="ctr"/>
+          <a:lstStyle/>
+          <a:p>
+            <a:pPr algn="ctr"/>
+            <a:endParaRPr lang="en-US"/>
+          </a:p>
+        </p:txBody>
+      </p:sp>
+      <p:pic>
+        <p:nvPicPr>
+          <p:cNvPr id="14" name="Picture 13">
+            <a:extLst>
+              <a:ext uri="{FF2B5EF4-FFF2-40B4-BE49-F238E27FC236}">
+                <a16:creationId xmlns:a16="http://schemas.microsoft.com/office/drawing/2014/main" id="{3DB40AB4-9805-406F-BAA1-B755CE88606D}"/>
+              </a:ext>
+            </a:extLst>
+          </p:cNvPr>
+          <p:cNvPicPr>
+            <a:picLocks noChangeAspect="1"/>
+          </p:cNvPicPr>
+          <p:nvPr/>
+        </p:nvPicPr>
+        <p:blipFill>
+          <a:blip r:embed="rId3">
+            <a:extLst>
+              <a:ext uri="{28A0092B-C50C-407E-A947-70E740481C1C}">
+                <a14:useLocalDpi xmlns:a14="http://schemas.microsoft.com/office/drawing/2010/main" val="0"/>
+              </a:ext>
+            </a:extLst>
+          </a:blip>
+          <a:stretch>
+            <a:fillRect/>
+          </a:stretch>
+        </p:blipFill>
+        <p:spPr>
+          <a:xfrm rot="20986080">
+            <a:off x="6550802" y="2784028"/>
+            <a:ext cx="1768883" cy="831375"/>
+          </a:xfrm>
+          <a:prstGeom prst="rect">
+            <a:avLst/>
+          </a:prstGeom>
+        </p:spPr>
+      </p:pic>
+      <p:sp>
+        <p:nvSpPr>
+          <p:cNvPr id="15" name="Rectangle 14">
+            <a:extLst>
+              <a:ext uri="{FF2B5EF4-FFF2-40B4-BE49-F238E27FC236}">
+                <a16:creationId xmlns:a16="http://schemas.microsoft.com/office/drawing/2014/main" id="{B4752078-84CF-4DE8-B702-274A9A4CDA03}"/>
+              </a:ext>
+            </a:extLst>
+          </p:cNvPr>
+          <p:cNvSpPr/>
+          <p:nvPr/>
+        </p:nvSpPr>
+        <p:spPr>
+          <a:xfrm rot="20727039">
+            <a:off x="6826488" y="3494662"/>
+            <a:ext cx="1978443" cy="276999"/>
+          </a:xfrm>
+          <a:prstGeom prst="rect">
+            <a:avLst/>
+          </a:prstGeom>
+          <a:solidFill>
+            <a:schemeClr val="tx1"/>
+          </a:solidFill>
+        </p:spPr>
+        <p:txBody>
+          <a:bodyPr wrap="square" lIns="91440" tIns="45720" rIns="91440" bIns="45720">
+            <a:spAutoFit/>
+          </a:bodyPr>
+          <a:lstStyle/>
+          <a:p>
+            <a:pPr algn="ctr"/>
+            <a:r>
+              <a:rPr lang="en-US" sz="1200" b="0" cap="none" spc="0" dirty="0">
+                <a:ln w="0"/>
+                <a:solidFill>
+                  <a:schemeClr val="bg1"/>
+                </a:solidFill>
+                <a:latin typeface="Arial Black" panose="020B0A04020102020204" pitchFamily="34" charset="0"/>
+              </a:rPr>
+              <a:t>28</a:t>
+            </a:r>
+            <a:r>
+              <a:rPr lang="en-US" sz="1200" b="0" cap="none" spc="0" baseline="30000" dirty="0">
+                <a:ln w="0"/>
+                <a:solidFill>
+                  <a:schemeClr val="bg1"/>
+                </a:solidFill>
+                <a:latin typeface="Arial Black" panose="020B0A04020102020204" pitchFamily="34" charset="0"/>
+              </a:rPr>
+              <a:t>th</a:t>
+            </a:r>
+            <a:r>
+              <a:rPr lang="en-US" sz="1200" b="0" cap="none" spc="0" dirty="0">
+                <a:ln w="0"/>
+                <a:solidFill>
+                  <a:schemeClr val="bg1"/>
+                </a:solidFill>
+                <a:latin typeface="Arial Black" panose="020B0A04020102020204" pitchFamily="34" charset="0"/>
+              </a:rPr>
+              <a:t> – 31</a:t>
+            </a:r>
+            <a:r>
+              <a:rPr lang="en-US" sz="1200" b="0" cap="none" spc="0" baseline="30000" dirty="0">
+                <a:ln w="0"/>
+                <a:solidFill>
+                  <a:schemeClr val="bg1"/>
+                </a:solidFill>
+                <a:latin typeface="Arial Black" panose="020B0A04020102020204" pitchFamily="34" charset="0"/>
+              </a:rPr>
+              <a:t>th</a:t>
+            </a:r>
+            <a:r>
+              <a:rPr lang="en-US" sz="1200" b="0" cap="none" spc="0" dirty="0">
+                <a:ln w="0"/>
+                <a:solidFill>
+                  <a:schemeClr val="bg1"/>
+                </a:solidFill>
+                <a:latin typeface="Arial Black" panose="020B0A04020102020204" pitchFamily="34" charset="0"/>
+              </a:rPr>
+              <a:t> May, 2020</a:t>
+            </a:r>
+          </a:p>
+        </p:txBody>
+      </p:sp>
+      <p:pic>
+        <p:nvPicPr>
+          <p:cNvPr id="17" name="Picture 16">
+            <a:extLst>
+              <a:ext uri="{FF2B5EF4-FFF2-40B4-BE49-F238E27FC236}">
+                <a16:creationId xmlns:a16="http://schemas.microsoft.com/office/drawing/2014/main" id="{0DB2BA2E-F107-43ED-9B65-02BD49261F70}"/>
+              </a:ext>
+            </a:extLst>
+          </p:cNvPr>
+          <p:cNvPicPr>
+            <a:picLocks noChangeAspect="1"/>
+          </p:cNvPicPr>
+          <p:nvPr/>
+        </p:nvPicPr>
+        <p:blipFill>
+          <a:blip r:embed="rId6">
+            <a:extLst>
+              <a:ext uri="{28A0092B-C50C-407E-A947-70E740481C1C}">
+                <a14:useLocalDpi xmlns:a14="http://schemas.microsoft.com/office/drawing/2010/main" val="0"/>
+              </a:ext>
+            </a:extLst>
+          </a:blip>
+          <a:srcRect/>
+          <a:stretch/>
+        </p:blipFill>
+        <p:spPr>
+          <a:xfrm rot="20700366">
+            <a:off x="8173839" y="3025714"/>
+            <a:ext cx="411242" cy="205621"/>
+          </a:xfrm>
+          <a:prstGeom prst="rect">
+            <a:avLst/>
+          </a:prstGeom>
+        </p:spPr>
+      </p:pic>
+      <p:grpSp>
+        <p:nvGrpSpPr>
+          <p:cNvPr id="25" name="Group 24">
+            <a:extLst>
+              <a:ext uri="{FF2B5EF4-FFF2-40B4-BE49-F238E27FC236}">
+                <a16:creationId xmlns:a16="http://schemas.microsoft.com/office/drawing/2014/main" id="{E6843850-E3AF-4468-AE21-AE688F7BCE95}"/>
+              </a:ext>
+            </a:extLst>
+          </p:cNvPr>
+          <p:cNvGrpSpPr/>
+          <p:nvPr/>
+        </p:nvGrpSpPr>
+        <p:grpSpPr>
+          <a:xfrm>
+            <a:off x="6445484" y="2784027"/>
+            <a:ext cx="1883100" cy="836287"/>
+            <a:chOff x="4051525" y="4737971"/>
+            <a:chExt cx="1883100" cy="836287"/>
+          </a:xfrm>
+        </p:grpSpPr>
+        <p:pic>
+          <p:nvPicPr>
+            <p:cNvPr id="20" name="Picture 19">
+              <a:extLst>
+                <a:ext uri="{FF2B5EF4-FFF2-40B4-BE49-F238E27FC236}">
+                  <a16:creationId xmlns:a16="http://schemas.microsoft.com/office/drawing/2014/main" id="{9B49FD00-E9EC-4199-9AC6-9580BF5654AF}"/>
+                </a:ext>
+              </a:extLst>
+            </p:cNvPr>
+            <p:cNvPicPr>
+              <a:picLocks noChangeAspect="1"/>
+            </p:cNvPicPr>
+            <p:nvPr/>
+          </p:nvPicPr>
+          <p:blipFill>
+            <a:blip r:embed="rId3">
+              <a:extLst>
+                <a:ext uri="{28A0092B-C50C-407E-A947-70E740481C1C}">
+                  <a14:useLocalDpi xmlns:a14="http://schemas.microsoft.com/office/drawing/2010/main" val="0"/>
+                </a:ext>
+              </a:extLst>
+            </a:blip>
+            <a:stretch>
+              <a:fillRect/>
+            </a:stretch>
+          </p:blipFill>
+          <p:spPr>
+            <a:xfrm rot="20986080">
+              <a:off x="4165742" y="4737971"/>
+              <a:ext cx="1768883" cy="831375"/>
+            </a:xfrm>
+            <a:prstGeom prst="rect">
+              <a:avLst/>
+            </a:prstGeom>
+          </p:spPr>
+        </p:pic>
+        <p:sp>
+          <p:nvSpPr>
+            <p:cNvPr id="21" name="Rectangle 20">
+              <a:extLst>
+                <a:ext uri="{FF2B5EF4-FFF2-40B4-BE49-F238E27FC236}">
+                  <a16:creationId xmlns:a16="http://schemas.microsoft.com/office/drawing/2014/main" id="{AD5431B9-53EC-4151-A536-B1A16A9F7C3E}"/>
+                </a:ext>
+              </a:extLst>
+            </p:cNvPr>
+            <p:cNvSpPr/>
+            <p:nvPr/>
+          </p:nvSpPr>
+          <p:spPr>
+            <a:xfrm rot="20855124">
+              <a:off x="4299583" y="4873882"/>
+              <a:ext cx="1220634" cy="259715"/>
+            </a:xfrm>
+            <a:prstGeom prst="rect">
+              <a:avLst/>
+            </a:prstGeom>
+            <a:solidFill>
+              <a:schemeClr val="bg1"/>
+            </a:solidFill>
+            <a:ln>
+              <a:noFill/>
+            </a:ln>
+          </p:spPr>
+          <p:style>
+            <a:lnRef idx="2">
+              <a:schemeClr val="accent1">
+                <a:shade val="50000"/>
+              </a:schemeClr>
+            </a:lnRef>
+            <a:fillRef idx="1">
+              <a:schemeClr val="accent1"/>
+            </a:fillRef>
+            <a:effectRef idx="0">
+              <a:schemeClr val="accent1"/>
+            </a:effectRef>
+            <a:fontRef idx="minor">
+              <a:schemeClr val="lt1"/>
+            </a:fontRef>
+          </p:style>
+          <p:txBody>
+            <a:bodyPr rtlCol="0" anchor="ctr"/>
+            <a:lstStyle/>
+            <a:p>
+              <a:pPr algn="ctr"/>
+              <a:endParaRPr lang="en-US"/>
+            </a:p>
+          </p:txBody>
+        </p:sp>
+        <p:sp>
+          <p:nvSpPr>
+            <p:cNvPr id="22" name="Rectangle 21">
+              <a:extLst>
+                <a:ext uri="{FF2B5EF4-FFF2-40B4-BE49-F238E27FC236}">
+                  <a16:creationId xmlns:a16="http://schemas.microsoft.com/office/drawing/2014/main" id="{2B186286-8846-4879-A234-8358E725CA11}"/>
+                </a:ext>
+              </a:extLst>
+            </p:cNvPr>
+            <p:cNvSpPr/>
+            <p:nvPr/>
+          </p:nvSpPr>
+          <p:spPr>
+            <a:xfrm rot="20751188">
+              <a:off x="4486527" y="5205587"/>
+              <a:ext cx="1220634" cy="250996"/>
+            </a:xfrm>
+            <a:prstGeom prst="rect">
+              <a:avLst/>
+            </a:prstGeom>
+            <a:solidFill>
+              <a:srgbClr val="FC0096"/>
+            </a:solidFill>
+            <a:ln>
+              <a:noFill/>
+            </a:ln>
+          </p:spPr>
+          <p:style>
+            <a:lnRef idx="2">
+              <a:schemeClr val="accent1">
+                <a:shade val="50000"/>
+              </a:schemeClr>
+            </a:lnRef>
+            <a:fillRef idx="1">
+              <a:schemeClr val="accent1"/>
+            </a:fillRef>
+            <a:effectRef idx="0">
+              <a:schemeClr val="accent1"/>
+            </a:effectRef>
+            <a:fontRef idx="minor">
+              <a:schemeClr val="lt1"/>
+            </a:fontRef>
+          </p:style>
+          <p:txBody>
+            <a:bodyPr rtlCol="0" anchor="ctr"/>
+            <a:lstStyle/>
+            <a:p>
+              <a:pPr algn="ctr"/>
+              <a:endParaRPr lang="en-US"/>
+            </a:p>
+          </p:txBody>
+        </p:sp>
+        <p:sp>
+          <p:nvSpPr>
+            <p:cNvPr id="23" name="Rectangle 22">
+              <a:extLst>
+                <a:ext uri="{FF2B5EF4-FFF2-40B4-BE49-F238E27FC236}">
+                  <a16:creationId xmlns:a16="http://schemas.microsoft.com/office/drawing/2014/main" id="{8AAD6BB3-5E1B-42B7-9024-1AD085CCF935}"/>
+                </a:ext>
+              </a:extLst>
+            </p:cNvPr>
+            <p:cNvSpPr/>
+            <p:nvPr/>
+          </p:nvSpPr>
+          <p:spPr>
+            <a:xfrm rot="20727039">
+              <a:off x="4051525" y="4748523"/>
+              <a:ext cx="1716750" cy="461665"/>
+            </a:xfrm>
+            <a:prstGeom prst="rect">
+              <a:avLst/>
+            </a:prstGeom>
+            <a:noFill/>
+          </p:spPr>
+          <p:txBody>
+            <a:bodyPr wrap="square" lIns="91440" tIns="45720" rIns="91440" bIns="45720">
+              <a:spAutoFit/>
+            </a:bodyPr>
+            <a:lstStyle/>
+            <a:p>
+              <a:pPr algn="ctr"/>
+              <a:r>
+                <a:rPr lang="en-US" sz="2400" b="0" cap="none" spc="0" dirty="0">
+                  <a:ln w="0"/>
+                  <a:latin typeface="Franklin Gothic Heavy" panose="020B0903020102020204" pitchFamily="34" charset="0"/>
+                </a:rPr>
+                <a:t>Dead Sea</a:t>
+              </a:r>
+            </a:p>
+          </p:txBody>
+        </p:sp>
+        <p:sp>
+          <p:nvSpPr>
+            <p:cNvPr id="24" name="Rectangle 23">
+              <a:extLst>
+                <a:ext uri="{FF2B5EF4-FFF2-40B4-BE49-F238E27FC236}">
+                  <a16:creationId xmlns:a16="http://schemas.microsoft.com/office/drawing/2014/main" id="{34B530DA-B862-4C35-92F2-2EA5931CD25A}"/>
+                </a:ext>
+              </a:extLst>
+            </p:cNvPr>
+            <p:cNvSpPr/>
+            <p:nvPr/>
+          </p:nvSpPr>
+          <p:spPr>
+            <a:xfrm rot="20727039">
+              <a:off x="4191808" y="5112593"/>
+              <a:ext cx="1716750" cy="461665"/>
+            </a:xfrm>
+            <a:prstGeom prst="rect">
+              <a:avLst/>
+            </a:prstGeom>
+            <a:noFill/>
+          </p:spPr>
+          <p:txBody>
+            <a:bodyPr wrap="square" lIns="91440" tIns="45720" rIns="91440" bIns="45720">
+              <a:spAutoFit/>
+            </a:bodyPr>
+            <a:lstStyle/>
+            <a:p>
+              <a:pPr algn="ctr"/>
+              <a:r>
+                <a:rPr lang="en-US" sz="2400" b="0" cap="none" spc="0" dirty="0">
+                  <a:ln w="0"/>
+                  <a:solidFill>
+                    <a:schemeClr val="bg1"/>
+                  </a:solidFill>
+                  <a:latin typeface="Franklin Gothic Heavy" panose="020B0903020102020204" pitchFamily="34" charset="0"/>
+                </a:rPr>
+                <a:t>Jordan</a:t>
+              </a:r>
+            </a:p>
+          </p:txBody>
+        </p:sp>
+      </p:grpSp>
+      <p:sp>
+        <p:nvSpPr>
+          <p:cNvPr id="26" name="Rectangle 25">
+            <a:extLst>
+              <a:ext uri="{FF2B5EF4-FFF2-40B4-BE49-F238E27FC236}">
+                <a16:creationId xmlns:a16="http://schemas.microsoft.com/office/drawing/2014/main" id="{1CBE5F1A-1183-4684-9D67-B785CF35BCC4}"/>
+              </a:ext>
+            </a:extLst>
+          </p:cNvPr>
+          <p:cNvSpPr/>
+          <p:nvPr/>
+        </p:nvSpPr>
+        <p:spPr>
+          <a:xfrm>
+            <a:off x="3446575" y="3362693"/>
+            <a:ext cx="1960653" cy="307777"/>
+          </a:xfrm>
+          <a:prstGeom prst="rect">
+            <a:avLst/>
+          </a:prstGeom>
+          <a:solidFill>
+            <a:srgbClr val="1E9DED"/>
+          </a:solidFill>
+        </p:spPr>
+        <p:txBody>
+          <a:bodyPr wrap="square" lIns="91440" tIns="45720" rIns="91440" bIns="45720">
+            <a:spAutoFit/>
+          </a:bodyPr>
+          <a:lstStyle/>
+          <a:p>
+            <a:pPr algn="ctr"/>
+            <a:r>
+              <a:rPr lang="en-US" sz="1400" b="0" cap="none" spc="0" dirty="0">
+                <a:ln w="0"/>
+                <a:solidFill>
+                  <a:schemeClr val="bg1"/>
+                </a:solidFill>
+                <a:latin typeface="Arial Black" panose="020B0A04020102020204" pitchFamily="34" charset="0"/>
+              </a:rPr>
+              <a:t>    Hotel </a:t>
+            </a:r>
+            <a:r>
+              <a:rPr lang="en-US" sz="1400" b="0" cap="none" spc="0" dirty="0" err="1">
+                <a:ln w="0"/>
+                <a:solidFill>
+                  <a:schemeClr val="bg1"/>
+                </a:solidFill>
+                <a:latin typeface="Arial Black" panose="020B0A04020102020204" pitchFamily="34" charset="0"/>
+              </a:rPr>
+              <a:t>Paradisus</a:t>
+            </a:r>
+            <a:endParaRPr lang="en-US" sz="1400" b="0" cap="none" spc="0" dirty="0">
+              <a:ln w="0"/>
+              <a:solidFill>
+                <a:schemeClr val="bg1"/>
+              </a:solidFill>
+              <a:latin typeface="Arial Black" panose="020B0A04020102020204" pitchFamily="34" charset="0"/>
+            </a:endParaRPr>
+          </a:p>
+        </p:txBody>
+      </p:sp>
+      <p:sp>
+        <p:nvSpPr>
+          <p:cNvPr id="29" name="Rectangle 28">
+            <a:extLst>
+              <a:ext uri="{FF2B5EF4-FFF2-40B4-BE49-F238E27FC236}">
+                <a16:creationId xmlns:a16="http://schemas.microsoft.com/office/drawing/2014/main" id="{EF13C2AE-AAD4-4D84-8819-5AFABFF1F5BC}"/>
+              </a:ext>
+            </a:extLst>
+          </p:cNvPr>
+          <p:cNvSpPr/>
+          <p:nvPr/>
+        </p:nvSpPr>
+        <p:spPr>
+          <a:xfrm>
+            <a:off x="9600671" y="3421424"/>
+            <a:ext cx="1785400" cy="307777"/>
+          </a:xfrm>
+          <a:prstGeom prst="rect">
+            <a:avLst/>
+          </a:prstGeom>
+          <a:solidFill>
+            <a:srgbClr val="1E9DED"/>
+          </a:solidFill>
+        </p:spPr>
+        <p:txBody>
+          <a:bodyPr wrap="square" lIns="91440" tIns="45720" rIns="91440" bIns="45720">
+            <a:spAutoFit/>
+          </a:bodyPr>
+          <a:lstStyle/>
+          <a:p>
+            <a:pPr algn="ctr"/>
+            <a:r>
+              <a:rPr lang="en-US" sz="1400" b="0" cap="none" spc="0" dirty="0">
+                <a:ln w="0"/>
+                <a:solidFill>
+                  <a:schemeClr val="bg1"/>
+                </a:solidFill>
+                <a:latin typeface="Arial Black" panose="020B0A04020102020204" pitchFamily="34" charset="0"/>
+              </a:rPr>
+              <a:t>   Crown Plaza</a:t>
+            </a:r>
+          </a:p>
+        </p:txBody>
+      </p:sp>
+      <p:pic>
+        <p:nvPicPr>
+          <p:cNvPr id="31" name="Picture 30">
+            <a:extLst>
+              <a:ext uri="{FF2B5EF4-FFF2-40B4-BE49-F238E27FC236}">
+                <a16:creationId xmlns:a16="http://schemas.microsoft.com/office/drawing/2014/main" id="{6BC1C983-BF2B-4AA9-811D-55C9BB94F5D7}"/>
+              </a:ext>
+            </a:extLst>
+          </p:cNvPr>
+          <p:cNvPicPr>
+            <a:picLocks noChangeAspect="1"/>
+          </p:cNvPicPr>
+          <p:nvPr/>
+        </p:nvPicPr>
+        <p:blipFill>
+          <a:blip r:embed="rId7">
+            <a:extLst>
+              <a:ext uri="{BEBA8EAE-BF5A-486C-A8C5-ECC9F3942E4B}">
+                <a14:imgProps xmlns:a14="http://schemas.microsoft.com/office/drawing/2010/main">
+                  <a14:imgLayer r:embed="rId8">
+                    <a14:imgEffect>
+                      <a14:brightnessContrast bright="100000"/>
+                    </a14:imgEffect>
+                  </a14:imgLayer>
+                </a14:imgProps>
+              </a:ext>
+              <a:ext uri="{28A0092B-C50C-407E-A947-70E740481C1C}">
+                <a14:useLocalDpi xmlns:a14="http://schemas.microsoft.com/office/drawing/2010/main" val="0"/>
+              </a:ext>
+            </a:extLst>
+          </a:blip>
+          <a:stretch>
+            <a:fillRect/>
+          </a:stretch>
+        </p:blipFill>
+        <p:spPr>
+          <a:xfrm>
+            <a:off x="9699885" y="3462207"/>
+            <a:ext cx="215648" cy="215648"/>
+          </a:xfrm>
+          <a:prstGeom prst="rect">
+            <a:avLst/>
+          </a:prstGeom>
+        </p:spPr>
+      </p:pic>
+      <p:pic>
+        <p:nvPicPr>
+          <p:cNvPr id="32" name="Picture 31">
+            <a:extLst>
+              <a:ext uri="{FF2B5EF4-FFF2-40B4-BE49-F238E27FC236}">
+                <a16:creationId xmlns:a16="http://schemas.microsoft.com/office/drawing/2014/main" id="{95AC144D-0B27-4FCA-9A9D-6EAFAEA5E58C}"/>
+              </a:ext>
+            </a:extLst>
+          </p:cNvPr>
+          <p:cNvPicPr>
+            <a:picLocks noChangeAspect="1"/>
+          </p:cNvPicPr>
+          <p:nvPr/>
+        </p:nvPicPr>
+        <p:blipFill>
+          <a:blip r:embed="rId7">
+            <a:extLst>
+              <a:ext uri="{BEBA8EAE-BF5A-486C-A8C5-ECC9F3942E4B}">
+                <a14:imgProps xmlns:a14="http://schemas.microsoft.com/office/drawing/2010/main">
+                  <a14:imgLayer r:embed="rId8">
+                    <a14:imgEffect>
+                      <a14:brightnessContrast bright="100000"/>
+                    </a14:imgEffect>
+                  </a14:imgLayer>
+                </a14:imgProps>
+              </a:ext>
+              <a:ext uri="{28A0092B-C50C-407E-A947-70E740481C1C}">
+                <a14:useLocalDpi xmlns:a14="http://schemas.microsoft.com/office/drawing/2010/main" val="0"/>
+              </a:ext>
+            </a:extLst>
+          </a:blip>
+          <a:stretch>
+            <a:fillRect/>
+          </a:stretch>
+        </p:blipFill>
+        <p:spPr>
+          <a:xfrm>
+            <a:off x="3501439" y="3395315"/>
+            <a:ext cx="215648" cy="215648"/>
+          </a:xfrm>
+          <a:prstGeom prst="rect">
+            <a:avLst/>
+          </a:prstGeom>
+        </p:spPr>
+      </p:pic>
+    </p:spTree>
+    <p:extLst>
+      <p:ext uri="{BB962C8B-B14F-4D97-AF65-F5344CB8AC3E}">
+        <p14:creationId xmlns:p14="http://schemas.microsoft.com/office/powerpoint/2010/main" val="3983699224"/>
+      </p:ext>
+    </p:extLst>
+  </p:cSld>
+  <p:clrMapOvr>
+    <a:masterClrMapping/>
+  </p:clrMapOvr>
+</p:sld>
+</file>
+
 <file path=ppt/theme/theme1.xml><?xml version="1.0" encoding="utf-8"?>
 <a:theme xmlns:a="http://schemas.openxmlformats.org/drawingml/2006/main" name="Office Theme">
   <a:themeElements>

</xml_diff>